<commit_message>
updated benchmarker and presentation
</commit_message>
<xml_diff>
--- a/demonstrations/demo2/presentation.pptx
+++ b/demonstrations/demo2/presentation.pptx
@@ -1349,11 +1349,11 @@
         </c:dLbls>
         <c:marker val="1"/>
         <c:smooth val="0"/>
-        <c:axId val="99679232"/>
-        <c:axId val="140720000"/>
+        <c:axId val="63459328"/>
+        <c:axId val="63460864"/>
       </c:lineChart>
       <c:catAx>
-        <c:axId val="99679232"/>
+        <c:axId val="63459328"/>
         <c:scaling>
           <c:orientation val="minMax"/>
         </c:scaling>
@@ -1373,7 +1373,7 @@
             <a:endParaRPr lang="en-US"/>
           </a:p>
         </c:txPr>
-        <c:crossAx val="140720000"/>
+        <c:crossAx val="63460864"/>
         <c:crosses val="autoZero"/>
         <c:auto val="1"/>
         <c:lblAlgn val="ctr"/>
@@ -1381,7 +1381,7 @@
         <c:noMultiLvlLbl val="0"/>
       </c:catAx>
       <c:valAx>
-        <c:axId val="140720000"/>
+        <c:axId val="63460864"/>
         <c:scaling>
           <c:orientation val="minMax"/>
         </c:scaling>
@@ -1402,7 +1402,7 @@
             <a:endParaRPr lang="en-US"/>
           </a:p>
         </c:txPr>
-        <c:crossAx val="99679232"/>
+        <c:crossAx val="63459328"/>
         <c:crosses val="autoZero"/>
         <c:crossBetween val="between"/>
       </c:valAx>
@@ -2617,11 +2617,11 @@
         </c:dLbls>
         <c:marker val="1"/>
         <c:smooth val="0"/>
-        <c:axId val="91384448"/>
-        <c:axId val="97591680"/>
+        <c:axId val="63216256"/>
+        <c:axId val="63222144"/>
       </c:lineChart>
       <c:catAx>
-        <c:axId val="91384448"/>
+        <c:axId val="63216256"/>
         <c:scaling>
           <c:orientation val="minMax"/>
         </c:scaling>
@@ -2641,7 +2641,7 @@
             <a:endParaRPr lang="en-US"/>
           </a:p>
         </c:txPr>
-        <c:crossAx val="97591680"/>
+        <c:crossAx val="63222144"/>
         <c:crosses val="autoZero"/>
         <c:auto val="1"/>
         <c:lblAlgn val="ctr"/>
@@ -2649,7 +2649,7 @@
         <c:noMultiLvlLbl val="0"/>
       </c:catAx>
       <c:valAx>
-        <c:axId val="97591680"/>
+        <c:axId val="63222144"/>
         <c:scaling>
           <c:orientation val="minMax"/>
         </c:scaling>
@@ -2670,14 +2670,13 @@
             <a:endParaRPr lang="en-US"/>
           </a:p>
         </c:txPr>
-        <c:crossAx val="91384448"/>
+        <c:crossAx val="63216256"/>
         <c:crosses val="autoZero"/>
         <c:crossBetween val="between"/>
       </c:valAx>
     </c:plotArea>
     <c:legend>
       <c:legendPos val="r"/>
-      <c:layout/>
       <c:overlay val="0"/>
       <c:txPr>
         <a:bodyPr/>
@@ -3876,11 +3875,11 @@
         </c:dLbls>
         <c:marker val="1"/>
         <c:smooth val="0"/>
-        <c:axId val="3458944"/>
-        <c:axId val="3460480"/>
+        <c:axId val="63358464"/>
+        <c:axId val="63360000"/>
       </c:lineChart>
       <c:catAx>
-        <c:axId val="3458944"/>
+        <c:axId val="63358464"/>
         <c:scaling>
           <c:orientation val="minMax"/>
         </c:scaling>
@@ -3900,7 +3899,7 @@
             <a:endParaRPr lang="en-US"/>
           </a:p>
         </c:txPr>
-        <c:crossAx val="3460480"/>
+        <c:crossAx val="63360000"/>
         <c:crosses val="autoZero"/>
         <c:auto val="1"/>
         <c:lblAlgn val="ctr"/>
@@ -3908,7 +3907,7 @@
         <c:noMultiLvlLbl val="0"/>
       </c:catAx>
       <c:valAx>
-        <c:axId val="3460480"/>
+        <c:axId val="63360000"/>
         <c:scaling>
           <c:orientation val="minMax"/>
         </c:scaling>
@@ -3929,14 +3928,13 @@
             <a:endParaRPr lang="en-US"/>
           </a:p>
         </c:txPr>
-        <c:crossAx val="3458944"/>
+        <c:crossAx val="63358464"/>
         <c:crosses val="autoZero"/>
         <c:crossBetween val="between"/>
       </c:valAx>
     </c:plotArea>
     <c:legend>
       <c:legendPos val="r"/>
-      <c:layout/>
       <c:overlay val="0"/>
       <c:txPr>
         <a:bodyPr/>
@@ -5108,11 +5106,11 @@
         </c:dLbls>
         <c:marker val="1"/>
         <c:smooth val="0"/>
-        <c:axId val="37702272"/>
-        <c:axId val="47126016"/>
+        <c:axId val="63431040"/>
+        <c:axId val="63432576"/>
       </c:lineChart>
       <c:catAx>
-        <c:axId val="37702272"/>
+        <c:axId val="63431040"/>
         <c:scaling>
           <c:orientation val="minMax"/>
         </c:scaling>
@@ -5132,7 +5130,7 @@
             <a:endParaRPr lang="en-US"/>
           </a:p>
         </c:txPr>
-        <c:crossAx val="47126016"/>
+        <c:crossAx val="63432576"/>
         <c:crosses val="autoZero"/>
         <c:auto val="1"/>
         <c:lblAlgn val="ctr"/>
@@ -5140,7 +5138,7 @@
         <c:noMultiLvlLbl val="0"/>
       </c:catAx>
       <c:valAx>
-        <c:axId val="47126016"/>
+        <c:axId val="63432576"/>
         <c:scaling>
           <c:orientation val="minMax"/>
         </c:scaling>
@@ -5161,14 +5159,13 @@
             <a:endParaRPr lang="en-US"/>
           </a:p>
         </c:txPr>
-        <c:crossAx val="37702272"/>
+        <c:crossAx val="63431040"/>
         <c:crosses val="autoZero"/>
         <c:crossBetween val="between"/>
       </c:valAx>
     </c:plotArea>
     <c:legend>
       <c:legendPos val="r"/>
-      <c:layout/>
       <c:overlay val="0"/>
       <c:txPr>
         <a:bodyPr/>
@@ -5273,7 +5270,7 @@
           <a:p>
             <a:fld id="{4D0CBB7A-33AF-434C-B8C5-B5F21D294CDF}" type="datetimeFigureOut">
               <a:rPr lang="tr-TR" smtClean="0"/>
-              <a:t>22.11.2015</a:t>
+              <a:t>28.11.2015</a:t>
             </a:fld>
             <a:endParaRPr lang="tr-TR"/>
           </a:p>
@@ -5438,7 +5435,7 @@
           <a:p>
             <a:fld id="{6C6C1039-E6FF-4F78-9751-FFD9A3AC8099}" type="datetimeFigureOut">
               <a:rPr lang="tr-TR" smtClean="0"/>
-              <a:t>22.11.2015</a:t>
+              <a:t>28.11.2015</a:t>
             </a:fld>
             <a:endParaRPr lang="tr-TR"/>
           </a:p>
@@ -7231,7 +7228,7 @@
           <a:p>
             <a:fld id="{DC9C75F7-98FD-4D05-8C3F-C506B544AE03}" type="datetimeFigureOut">
               <a:rPr lang="tr-TR" smtClean="0"/>
-              <a:t>22.11.2015</a:t>
+              <a:t>28.11.2015</a:t>
             </a:fld>
             <a:endParaRPr lang="tr-TR"/>
           </a:p>
@@ -7420,7 +7417,7 @@
           <a:p>
             <a:fld id="{DC9C75F7-98FD-4D05-8C3F-C506B544AE03}" type="datetimeFigureOut">
               <a:rPr lang="tr-TR" smtClean="0"/>
-              <a:t>22.11.2015</a:t>
+              <a:t>28.11.2015</a:t>
             </a:fld>
             <a:endParaRPr lang="tr-TR"/>
           </a:p>
@@ -7612,7 +7609,7 @@
           <a:p>
             <a:fld id="{DC9C75F7-98FD-4D05-8C3F-C506B544AE03}" type="datetimeFigureOut">
               <a:rPr lang="tr-TR" smtClean="0"/>
-              <a:t>22.11.2015</a:t>
+              <a:t>28.11.2015</a:t>
             </a:fld>
             <a:endParaRPr lang="tr-TR"/>
           </a:p>
@@ -7794,7 +7791,7 @@
           <a:p>
             <a:fld id="{DC9C75F7-98FD-4D05-8C3F-C506B544AE03}" type="datetimeFigureOut">
               <a:rPr lang="tr-TR" smtClean="0"/>
-              <a:t>22.11.2015</a:t>
+              <a:t>28.11.2015</a:t>
             </a:fld>
             <a:endParaRPr lang="tr-TR"/>
           </a:p>
@@ -8052,7 +8049,7 @@
           <a:p>
             <a:fld id="{DC9C75F7-98FD-4D05-8C3F-C506B544AE03}" type="datetimeFigureOut">
               <a:rPr lang="tr-TR" smtClean="0"/>
-              <a:t>22.11.2015</a:t>
+              <a:t>28.11.2015</a:t>
             </a:fld>
             <a:endParaRPr lang="tr-TR"/>
           </a:p>
@@ -8352,7 +8349,7 @@
           <a:p>
             <a:fld id="{DC9C75F7-98FD-4D05-8C3F-C506B544AE03}" type="datetimeFigureOut">
               <a:rPr lang="tr-TR" smtClean="0"/>
-              <a:t>22.11.2015</a:t>
+              <a:t>28.11.2015</a:t>
             </a:fld>
             <a:endParaRPr lang="tr-TR"/>
           </a:p>
@@ -8786,7 +8783,7 @@
           <a:p>
             <a:fld id="{DC9C75F7-98FD-4D05-8C3F-C506B544AE03}" type="datetimeFigureOut">
               <a:rPr lang="tr-TR" smtClean="0"/>
-              <a:t>22.11.2015</a:t>
+              <a:t>28.11.2015</a:t>
             </a:fld>
             <a:endParaRPr lang="tr-TR"/>
           </a:p>
@@ -8916,7 +8913,7 @@
           <a:p>
             <a:fld id="{DC9C75F7-98FD-4D05-8C3F-C506B544AE03}" type="datetimeFigureOut">
               <a:rPr lang="tr-TR" smtClean="0"/>
-              <a:t>22.11.2015</a:t>
+              <a:t>28.11.2015</a:t>
             </a:fld>
             <a:endParaRPr lang="tr-TR"/>
           </a:p>
@@ -9023,7 +9020,7 @@
           <a:p>
             <a:fld id="{DC9C75F7-98FD-4D05-8C3F-C506B544AE03}" type="datetimeFigureOut">
               <a:rPr lang="tr-TR" smtClean="0"/>
-              <a:t>22.11.2015</a:t>
+              <a:t>28.11.2015</a:t>
             </a:fld>
             <a:endParaRPr lang="tr-TR"/>
           </a:p>
@@ -9312,7 +9309,7 @@
           <a:p>
             <a:fld id="{DC9C75F7-98FD-4D05-8C3F-C506B544AE03}" type="datetimeFigureOut">
               <a:rPr lang="tr-TR" smtClean="0"/>
-              <a:t>22.11.2015</a:t>
+              <a:t>28.11.2015</a:t>
             </a:fld>
             <a:endParaRPr lang="tr-TR"/>
           </a:p>
@@ -9577,7 +9574,7 @@
           <a:p>
             <a:fld id="{DC9C75F7-98FD-4D05-8C3F-C506B544AE03}" type="datetimeFigureOut">
               <a:rPr lang="tr-TR" smtClean="0"/>
-              <a:t>22.11.2015</a:t>
+              <a:t>28.11.2015</a:t>
             </a:fld>
             <a:endParaRPr lang="tr-TR"/>
           </a:p>
@@ -9811,7 +9808,7 @@
           <a:p>
             <a:fld id="{DC9C75F7-98FD-4D05-8C3F-C506B544AE03}" type="datetimeFigureOut">
               <a:rPr lang="tr-TR" smtClean="0"/>
-              <a:t>22.11.2015</a:t>
+              <a:t>28.11.2015</a:t>
             </a:fld>
             <a:endParaRPr lang="tr-TR"/>
           </a:p>
@@ -10243,8 +10240,8 @@
         </p:nvSpPr>
         <p:spPr>
           <a:xfrm>
-            <a:off x="4330741" y="5950823"/>
-            <a:ext cx="9423358" cy="1277273"/>
+            <a:off x="1512740" y="2548372"/>
+            <a:ext cx="15265694" cy="2508379"/>
           </a:xfrm>
           <a:prstGeom prst="rect">
             <a:avLst/>
@@ -10259,6 +10256,17 @@
           <a:p>
             <a:pPr algn="ctr"/>
             <a:r>
+              <a:rPr lang="en-GB" sz="7700" dirty="0" err="1" smtClean="0">
+                <a:solidFill>
+                  <a:schemeClr val="accent5">
+                    <a:lumMod val="75000"/>
+                  </a:schemeClr>
+                </a:solidFill>
+                <a:latin typeface="Novecento sans wide Book" pitchFamily="50" charset="-94"/>
+              </a:rPr>
+              <a:t>GameMaker</a:t>
+            </a:r>
+            <a:r>
               <a:rPr lang="en-GB" sz="7700" dirty="0" smtClean="0">
                 <a:solidFill>
                   <a:schemeClr val="accent5">
@@ -10267,9 +10275,45 @@
                 </a:solidFill>
                 <a:latin typeface="Novecento sans wide Book" pitchFamily="50" charset="-94"/>
               </a:rPr>
+              <a:t> Studio </a:t>
+            </a:r>
+            <a:r>
+              <a:rPr lang="en-GB" sz="7700" dirty="0" smtClean="0">
+                <a:solidFill>
+                  <a:schemeClr val="accent5">
+                    <a:lumMod val="75000"/>
+                  </a:schemeClr>
+                </a:solidFill>
+                <a:latin typeface="Novecento sans wide Book" pitchFamily="50" charset="-94"/>
+              </a:rPr>
               <a:t>HTML5 Export</a:t>
             </a:r>
-            <a:endParaRPr lang="tr-TR" sz="7700" dirty="0">
+          </a:p>
+          <a:p>
+            <a:pPr algn="ctr"/>
+            <a:r>
+              <a:rPr lang="en-GB" sz="8000">
+                <a:solidFill>
+                  <a:schemeClr val="accent5">
+                    <a:lumMod val="75000"/>
+                  </a:schemeClr>
+                </a:solidFill>
+                <a:latin typeface="Novecento sans wide Book" pitchFamily="50" charset="-94"/>
+              </a:rPr>
+              <a:t>Networking </a:t>
+            </a:r>
+            <a:r>
+              <a:rPr lang="en-GB" sz="8000" smtClean="0">
+                <a:solidFill>
+                  <a:schemeClr val="accent5">
+                    <a:lumMod val="75000"/>
+                  </a:schemeClr>
+                </a:solidFill>
+                <a:latin typeface="Novecento sans wide Book" pitchFamily="50" charset="-94"/>
+              </a:rPr>
+              <a:t>Extension</a:t>
+            </a:r>
+            <a:endParaRPr lang="tr-TR" sz="8000">
               <a:solidFill>
                 <a:schemeClr val="accent5">
                   <a:lumMod val="75000"/>
@@ -10280,99 +10324,6 @@
           </a:p>
         </p:txBody>
       </p:sp>
-      <p:sp>
-        <p:nvSpPr>
-          <p:cNvPr id="17" name="TextBox 16"/>
-          <p:cNvSpPr txBox="1"/>
-          <p:nvPr/>
-        </p:nvSpPr>
-        <p:spPr>
-          <a:xfrm>
-            <a:off x="6274957" y="6945287"/>
-            <a:ext cx="5534926" cy="661720"/>
-          </a:xfrm>
-          <a:prstGeom prst="rect">
-            <a:avLst/>
-          </a:prstGeom>
-          <a:noFill/>
-        </p:spPr>
-        <p:txBody>
-          <a:bodyPr wrap="square" rtlCol="0">
-            <a:spAutoFit/>
-          </a:bodyPr>
-          <a:lstStyle/>
-          <a:p>
-            <a:pPr algn="ctr"/>
-            <a:r>
-              <a:rPr lang="en-GB" sz="3700" dirty="0" smtClean="0">
-                <a:solidFill>
-                  <a:schemeClr val="accent5">
-                    <a:lumMod val="75000"/>
-                  </a:schemeClr>
-                </a:solidFill>
-                <a:latin typeface="Novecento sans wide Book" pitchFamily="50" charset="-94"/>
-              </a:rPr>
-              <a:t>Networking Extension</a:t>
-            </a:r>
-            <a:endParaRPr lang="tr-TR" sz="3700" dirty="0">
-              <a:solidFill>
-                <a:schemeClr val="accent5">
-                  <a:lumMod val="75000"/>
-                </a:schemeClr>
-              </a:solidFill>
-              <a:latin typeface="Novecento sans wide Book" pitchFamily="50" charset="-94"/>
-            </a:endParaRPr>
-          </a:p>
-        </p:txBody>
-      </p:sp>
-      <p:pic>
-        <p:nvPicPr>
-          <p:cNvPr id="1026" name="Picture 2" descr="C:\Users\Teun\Desktop\UNI2016\HONS\demo2\logo-full.png"/>
-          <p:cNvPicPr>
-            <a:picLocks noChangeAspect="1" noChangeArrowheads="1"/>
-          </p:cNvPicPr>
-          <p:nvPr/>
-        </p:nvPicPr>
-        <p:blipFill>
-          <a:blip r:embed="rId4">
-            <a:extLst>
-              <a:ext uri="{28A0092B-C50C-407E-A947-70E740481C1C}">
-                <a14:useLocalDpi xmlns:a14="http://schemas.microsoft.com/office/drawing/2010/main" val="0"/>
-              </a:ext>
-            </a:extLst>
-          </a:blip>
-          <a:srcRect/>
-          <a:stretch>
-            <a:fillRect/>
-          </a:stretch>
-        </p:blipFill>
-        <p:spPr bwMode="auto">
-          <a:xfrm>
-            <a:off x="3670227" y="2327265"/>
-            <a:ext cx="10659936" cy="2394614"/>
-          </a:xfrm>
-          <a:prstGeom prst="rect">
-            <a:avLst/>
-          </a:prstGeom>
-          <a:noFill/>
-          <a:effectLst>
-            <a:outerShdw blurRad="76200" dist="63500" dir="3240000" algn="ctr" rotWithShape="0">
-              <a:schemeClr val="tx1">
-                <a:alpha val="55000"/>
-              </a:schemeClr>
-            </a:outerShdw>
-          </a:effectLst>
-          <a:extLst>
-            <a:ext uri="{909E8E84-426E-40DD-AFC4-6F175D3DCCD1}">
-              <a14:hiddenFill xmlns:a14="http://schemas.microsoft.com/office/drawing/2010/main">
-                <a:solidFill>
-                  <a:srgbClr val="FFFFFF"/>
-                </a:solidFill>
-              </a14:hiddenFill>
-            </a:ext>
-          </a:extLst>
-        </p:spPr>
-      </p:pic>
     </p:spTree>
     <p:extLst>
       <p:ext uri="{BB962C8B-B14F-4D97-AF65-F5344CB8AC3E}">
@@ -10497,41 +10448,6 @@
                                   </p:childTnLst>
                                 </p:cTn>
                               </p:par>
-                              <p:par>
-                                <p:cTn id="12" presetID="10" presetClass="entr" presetSubtype="0" fill="hold" grpId="0" nodeType="withEffect">
-                                  <p:stCondLst>
-                                    <p:cond delay="0"/>
-                                  </p:stCondLst>
-                                  <p:childTnLst>
-                                    <p:set>
-                                      <p:cBhvr>
-                                        <p:cTn id="13" dur="1" fill="hold">
-                                          <p:stCondLst>
-                                            <p:cond delay="0"/>
-                                          </p:stCondLst>
-                                        </p:cTn>
-                                        <p:tgtEl>
-                                          <p:spTgt spid="17"/>
-                                        </p:tgtEl>
-                                        <p:attrNameLst>
-                                          <p:attrName>style.visibility</p:attrName>
-                                        </p:attrNameLst>
-                                      </p:cBhvr>
-                                      <p:to>
-                                        <p:strVal val="visible"/>
-                                      </p:to>
-                                    </p:set>
-                                    <p:animEffect transition="in" filter="fade">
-                                      <p:cBhvr>
-                                        <p:cTn id="14" dur="500"/>
-                                        <p:tgtEl>
-                                          <p:spTgt spid="17"/>
-                                        </p:tgtEl>
-                                      </p:cBhvr>
-                                    </p:animEffect>
-                                  </p:childTnLst>
-                                </p:cTn>
-                              </p:par>
                             </p:childTnLst>
                           </p:cTn>
                         </p:par>
@@ -10561,7 +10477,6 @@
     </p:tnLst>
     <p:bldLst>
       <p:bldP spid="16" grpId="0"/>
-      <p:bldP spid="17" grpId="0"/>
     </p:bldLst>
   </p:timing>
 </p:sld>
@@ -10844,15 +10759,6 @@
               </a:rPr>
               <a:t>.</a:t>
             </a:r>
-            <a:endParaRPr lang="en-GB" sz="2400" dirty="0" smtClean="0">
-              <a:solidFill>
-                <a:schemeClr val="accent5">
-                  <a:lumMod val="75000"/>
-                </a:schemeClr>
-              </a:solidFill>
-              <a:latin typeface="Novecento sans wide Book" pitchFamily="50" charset="-94"/>
-              <a:cs typeface="Klavika" panose="020B0706030404030204" pitchFamily="34" charset="0"/>
-            </a:endParaRPr>
           </a:p>
         </p:txBody>
       </p:sp>
@@ -12303,19 +12209,7 @@
                 <a:latin typeface="Novecento sans wide Book" pitchFamily="50" charset="-94"/>
                 <a:cs typeface="Klavika" panose="020B0706030404030204" pitchFamily="34" charset="0"/>
               </a:rPr>
-              <a:t>Ping and deviation shoot up after having roughly 240 clients each sending 30 request every second</a:t>
-            </a:r>
-            <a:r>
-              <a:rPr lang="en-GB" sz="2400" dirty="0" smtClean="0">
-                <a:solidFill>
-                  <a:schemeClr val="accent5">
-                    <a:lumMod val="75000"/>
-                  </a:schemeClr>
-                </a:solidFill>
-                <a:latin typeface="Novecento sans wide Book" pitchFamily="50" charset="-94"/>
-                <a:cs typeface="Klavika" panose="020B0706030404030204" pitchFamily="34" charset="0"/>
-              </a:rPr>
-              <a:t>.</a:t>
+              <a:t>Ping and deviation shoot up after having roughly 240 clients each sending 30 request every second.</a:t>
             </a:r>
           </a:p>
           <a:p>
@@ -12638,20 +12532,10 @@
                 <a:latin typeface="Novecento sans wide Book" pitchFamily="50" charset="-94"/>
                 <a:cs typeface="Klavika" panose="020B0706030404030204" pitchFamily="34" charset="0"/>
               </a:rPr>
-              <a:t> do not support more than 1000 instances without resulting in the application slowing down, and thus causing the ping consistency to </a:t>
-            </a:r>
-            <a:r>
-              <a:rPr lang="en-GB" dirty="0" smtClean="0">
-                <a:solidFill>
-                  <a:schemeClr val="accent5">
-                    <a:lumMod val="75000"/>
-                  </a:schemeClr>
-                </a:solidFill>
-                <a:latin typeface="Novecento sans wide Book" pitchFamily="50" charset="-94"/>
-                <a:cs typeface="Klavika" panose="020B0706030404030204" pitchFamily="34" charset="0"/>
-              </a:rPr>
-              <a:t>fluctuate.</a:t>
-            </a:r>
+              <a:t> do not support more than 1000 instances without resulting in the application slowing down, and thus causing the ping consistency to fluctuate.</a:t>
+            </a:r>
+          </a:p>
+          <a:p>
             <a:endParaRPr lang="en-GB" dirty="0" smtClean="0">
               <a:solidFill>
                 <a:schemeClr val="accent5">
@@ -12663,17 +12547,6 @@
             </a:endParaRPr>
           </a:p>
           <a:p>
-            <a:endParaRPr lang="en-GB" dirty="0" smtClean="0">
-              <a:solidFill>
-                <a:schemeClr val="accent5">
-                  <a:lumMod val="75000"/>
-                </a:schemeClr>
-              </a:solidFill>
-              <a:latin typeface="Novecento sans wide Book" pitchFamily="50" charset="-94"/>
-              <a:cs typeface="Klavika" panose="020B0706030404030204" pitchFamily="34" charset="0"/>
-            </a:endParaRPr>
-          </a:p>
-          <a:p>
             <a:r>
               <a:rPr lang="en-GB" dirty="0" smtClean="0">
                 <a:solidFill>
@@ -12684,31 +12557,7 @@
                 <a:latin typeface="Novecento sans wide Book" pitchFamily="50" charset="-94"/>
                 <a:cs typeface="Klavika" panose="020B0706030404030204" pitchFamily="34" charset="0"/>
               </a:rPr>
-              <a:t>Thus far the server appears to handle well over 1000 messages per second, but the tests are cut short by the limitation of computational strength </a:t>
-            </a:r>
-            <a:r>
-              <a:rPr lang="en-GB" dirty="0" smtClean="0">
-                <a:solidFill>
-                  <a:schemeClr val="accent5">
-                    <a:lumMod val="75000"/>
-                  </a:schemeClr>
-                </a:solidFill>
-                <a:latin typeface="Novecento sans wide Book" pitchFamily="50" charset="-94"/>
-                <a:cs typeface="Klavika" panose="020B0706030404030204" pitchFamily="34" charset="0"/>
-              </a:rPr>
-              <a:t>when forcing over 1000 virtual clients into one client</a:t>
-            </a:r>
-            <a:r>
-              <a:rPr lang="en-GB" dirty="0" smtClean="0">
-                <a:solidFill>
-                  <a:schemeClr val="accent5">
-                    <a:lumMod val="75000"/>
-                  </a:schemeClr>
-                </a:solidFill>
-                <a:latin typeface="Novecento sans wide Book" pitchFamily="50" charset="-94"/>
-                <a:cs typeface="Klavika" panose="020B0706030404030204" pitchFamily="34" charset="0"/>
-              </a:rPr>
-              <a:t>.</a:t>
+              <a:t>Thus far the server appears to handle well over 1000 messages per second, but the tests are cut short by the limitation of computational strength when forcing over 1000 virtual clients into one client.</a:t>
             </a:r>
           </a:p>
           <a:p>
@@ -12733,65 +12582,8 @@
                 <a:latin typeface="Novecento sans wide Book" pitchFamily="50" charset="-94"/>
                 <a:cs typeface="Klavika" panose="020B0706030404030204" pitchFamily="34" charset="0"/>
               </a:rPr>
-              <a:t>Socket.io is suggested to handle up to 9.000 to 10.000 messages per second on a </a:t>
-            </a:r>
-            <a:r>
-              <a:rPr lang="en-GB" dirty="0">
-                <a:solidFill>
-                  <a:schemeClr val="accent5">
-                    <a:lumMod val="75000"/>
-                  </a:schemeClr>
-                </a:solidFill>
-                <a:latin typeface="Novecento sans wide Book" pitchFamily="50" charset="-94"/>
-                <a:cs typeface="Klavika" panose="020B0706030404030204" pitchFamily="34" charset="0"/>
-              </a:rPr>
-              <a:t>3.3 GHz Xeon </a:t>
-            </a:r>
-            <a:r>
-              <a:rPr lang="en-GB" dirty="0">
-                <a:solidFill>
-                  <a:schemeClr val="accent5">
-                    <a:lumMod val="75000"/>
-                  </a:schemeClr>
-                </a:solidFill>
-                <a:latin typeface="Novecento sans wide Book" pitchFamily="50" charset="-94"/>
-                <a:cs typeface="Klavika" panose="020B0706030404030204" pitchFamily="34" charset="0"/>
-              </a:rPr>
-              <a:t>X5470 server </a:t>
-            </a:r>
-            <a:r>
-              <a:rPr lang="en-GB" dirty="0">
-                <a:solidFill>
-                  <a:schemeClr val="accent5">
-                    <a:lumMod val="75000"/>
-                  </a:schemeClr>
-                </a:solidFill>
-                <a:latin typeface="Novecento sans wide Book" pitchFamily="50" charset="-94"/>
-                <a:cs typeface="Klavika" panose="020B0706030404030204" pitchFamily="34" charset="0"/>
-              </a:rPr>
-              <a:t>using one </a:t>
-            </a:r>
-            <a:r>
-              <a:rPr lang="en-GB" dirty="0">
-                <a:solidFill>
-                  <a:schemeClr val="accent5">
-                    <a:lumMod val="75000"/>
-                  </a:schemeClr>
-                </a:solidFill>
-                <a:latin typeface="Novecento sans wide Book" pitchFamily="50" charset="-94"/>
-                <a:cs typeface="Klavika" panose="020B0706030404030204" pitchFamily="34" charset="0"/>
-              </a:rPr>
-              <a:t>core.</a:t>
-            </a:r>
-            <a:endParaRPr lang="en-GB" dirty="0">
-              <a:solidFill>
-                <a:schemeClr val="accent5">
-                  <a:lumMod val="75000"/>
-                </a:schemeClr>
-              </a:solidFill>
-              <a:latin typeface="Novecento sans wide Book" pitchFamily="50" charset="-94"/>
-              <a:cs typeface="Klavika" panose="020B0706030404030204" pitchFamily="34" charset="0"/>
-            </a:endParaRPr>
+              <a:t>Socket.io is suggested to handle up to 9.000 to 10.000 messages per second on a 3.3 GHz Xeon X5470 server using one core.</a:t>
+            </a:r>
           </a:p>
           <a:p>
             <a:endParaRPr lang="en-GB" dirty="0">
@@ -12922,15 +12714,6 @@
               </a:rPr>
               <a:t>http://drewww.github.io/socket.io-benchmarking/</a:t>
             </a:r>
-            <a:endParaRPr lang="en-GB" dirty="0">
-              <a:solidFill>
-                <a:schemeClr val="accent5">
-                  <a:lumMod val="75000"/>
-                </a:schemeClr>
-              </a:solidFill>
-              <a:latin typeface="Novecento sans wide Book" pitchFamily="50" charset="-94"/>
-              <a:cs typeface="Klavika" panose="020B0706030404030204" pitchFamily="34" charset="0"/>
-            </a:endParaRPr>
           </a:p>
         </p:txBody>
       </p:sp>
@@ -15462,18 +15245,7 @@
                 </a:solidFill>
                 <a:latin typeface="Novecento sans wide Book" pitchFamily="50" charset="-94"/>
               </a:rPr>
-              <a:t>answerıng </a:t>
-            </a:r>
-            <a:r>
-              <a:rPr lang="tr-TR" sz="3000" dirty="0" smtClean="0">
-                <a:solidFill>
-                  <a:schemeClr val="accent5">
-                    <a:lumMod val="75000"/>
-                  </a:schemeClr>
-                </a:solidFill>
-                <a:latin typeface="Novecento sans wide Book" pitchFamily="50" charset="-94"/>
-              </a:rPr>
-              <a:t>questıons now</a:t>
+              <a:t>answerıng questıons now</a:t>
             </a:r>
             <a:endParaRPr lang="tr-TR" sz="3000" dirty="0">
               <a:solidFill>
@@ -15839,7 +15611,19 @@
                 <a:latin typeface="Novecento sans wide Book" pitchFamily="50" charset="-94"/>
                 <a:cs typeface="Klavika" panose="020B0706030404030204" pitchFamily="34" charset="0"/>
               </a:rPr>
-              <a:t>For </a:t>
+              <a:t>For similar game development platforms, </a:t>
+            </a:r>
+            <a:r>
+              <a:rPr lang="en-GB" dirty="0">
+                <a:solidFill>
+                  <a:schemeClr val="accent5">
+                    <a:lumMod val="75000"/>
+                  </a:schemeClr>
+                </a:solidFill>
+                <a:latin typeface="Novecento sans wide Book" pitchFamily="50" charset="-94"/>
+                <a:cs typeface="Klavika" panose="020B0706030404030204" pitchFamily="34" charset="0"/>
+              </a:rPr>
+              <a:t>such as Unity, an official video tutorial that teaches how to do it is an hour </a:t>
             </a:r>
             <a:r>
               <a:rPr lang="en-GB" dirty="0" smtClean="0">
@@ -15851,53 +15635,8 @@
                 <a:latin typeface="Novecento sans wide Book" pitchFamily="50" charset="-94"/>
                 <a:cs typeface="Klavika" panose="020B0706030404030204" pitchFamily="34" charset="0"/>
               </a:rPr>
-              <a:t>similar game development platforms, </a:t>
-            </a:r>
-            <a:r>
-              <a:rPr lang="en-GB" dirty="0">
-                <a:solidFill>
-                  <a:schemeClr val="accent5">
-                    <a:lumMod val="75000"/>
-                  </a:schemeClr>
-                </a:solidFill>
-                <a:latin typeface="Novecento sans wide Book" pitchFamily="50" charset="-94"/>
-                <a:cs typeface="Klavika" panose="020B0706030404030204" pitchFamily="34" charset="0"/>
-              </a:rPr>
-              <a:t>such as Unity, an official video tutorial that teaches how to do it is an hour </a:t>
-            </a:r>
-            <a:r>
-              <a:rPr lang="en-GB" dirty="0" smtClean="0">
-                <a:solidFill>
-                  <a:schemeClr val="accent5">
-                    <a:lumMod val="75000"/>
-                  </a:schemeClr>
-                </a:solidFill>
-                <a:latin typeface="Novecento sans wide Book" pitchFamily="50" charset="-94"/>
-                <a:cs typeface="Klavika" panose="020B0706030404030204" pitchFamily="34" charset="0"/>
-              </a:rPr>
-              <a:t>long</a:t>
-            </a:r>
-            <a:r>
-              <a:rPr lang="en-GB" dirty="0" smtClean="0">
-                <a:solidFill>
-                  <a:schemeClr val="accent5">
-                    <a:lumMod val="75000"/>
-                  </a:schemeClr>
-                </a:solidFill>
-                <a:latin typeface="Novecento sans wide Book" pitchFamily="50" charset="-94"/>
-                <a:cs typeface="Klavika" panose="020B0706030404030204" pitchFamily="34" charset="0"/>
-              </a:rPr>
-              <a:t>.</a:t>
-            </a:r>
-            <a:endParaRPr lang="en-GB" dirty="0" smtClean="0">
-              <a:solidFill>
-                <a:schemeClr val="accent5">
-                  <a:lumMod val="75000"/>
-                </a:schemeClr>
-              </a:solidFill>
-              <a:latin typeface="Novecento sans wide Book" pitchFamily="50" charset="-94"/>
-              <a:cs typeface="Klavika" panose="020B0706030404030204" pitchFamily="34" charset="0"/>
-            </a:endParaRPr>
+              <a:t>long.</a:t>
+            </a:r>
           </a:p>
         </p:txBody>
       </p:sp>
@@ -16328,19 +16067,7 @@
                 <a:latin typeface="Novecento sans wide Book" pitchFamily="50" charset="-94"/>
                 <a:cs typeface="Klavika" panose="020B0706030404030204" pitchFamily="34" charset="0"/>
               </a:rPr>
-              <a:t>other </a:t>
-            </a:r>
-            <a:r>
-              <a:rPr lang="en-GB" smtClean="0">
-                <a:solidFill>
-                  <a:schemeClr val="accent5">
-                    <a:lumMod val="75000"/>
-                  </a:schemeClr>
-                </a:solidFill>
-                <a:latin typeface="Novecento sans wide Book" pitchFamily="50" charset="-94"/>
-                <a:cs typeface="Klavika" panose="020B0706030404030204" pitchFamily="34" charset="0"/>
-              </a:rPr>
-              <a:t>applications and </a:t>
+              <a:t>other applications and </a:t>
             </a:r>
             <a:r>
               <a:rPr lang="en-GB" dirty="0" smtClean="0">
@@ -16530,15 +16257,6 @@
               </a:rPr>
               <a:t>http://gamemaker.wiki/game-maker-versions</a:t>
             </a:r>
-            <a:endParaRPr lang="en-GB" dirty="0">
-              <a:solidFill>
-                <a:schemeClr val="accent5">
-                  <a:lumMod val="75000"/>
-                </a:schemeClr>
-              </a:solidFill>
-              <a:latin typeface="Novecento sans wide Book" pitchFamily="50" charset="-94"/>
-              <a:cs typeface="Klavika" panose="020B0706030404030204" pitchFamily="34" charset="0"/>
-            </a:endParaRPr>
           </a:p>
         </p:txBody>
       </p:sp>
@@ -17353,20 +17071,7 @@
                 <a:latin typeface="Novecento sans wide Book" pitchFamily="50" charset="-94"/>
                 <a:cs typeface="Klavika" panose="020B0706030404030204" pitchFamily="34" charset="0"/>
               </a:rPr>
-              <a:t>browsers</a:t>
-            </a:r>
-            <a:r>
-              <a:rPr lang="en-GB" sz="2100" b="1" dirty="0" smtClean="0">
-                <a:solidFill>
-                  <a:schemeClr val="tx1">
-                    <a:lumMod val="75000"/>
-                    <a:lumOff val="25000"/>
-                  </a:schemeClr>
-                </a:solidFill>
-                <a:latin typeface="Novecento sans wide Book" pitchFamily="50" charset="-94"/>
-                <a:cs typeface="Klavika" panose="020B0706030404030204" pitchFamily="34" charset="0"/>
-              </a:rPr>
-              <a:t>”</a:t>
+              <a:t>browsers”</a:t>
             </a:r>
           </a:p>
           <a:p>
@@ -17427,29 +17132,8 @@
                 <a:latin typeface="Novecento sans wide Book" pitchFamily="50" charset="-94"/>
                 <a:cs typeface="Klavika" panose="020B0706030404030204" pitchFamily="34" charset="0"/>
               </a:rPr>
-              <a:t>Today, in the world of social networking and competitive gaming, many applications benefit from having direct contact with other clients. These applications have a much greater potential to become more popular with the end-users as they support social </a:t>
-            </a:r>
-            <a:r>
-              <a:rPr lang="en-GB" dirty="0" smtClean="0">
-                <a:solidFill>
-                  <a:schemeClr val="accent5">
-                    <a:lumMod val="75000"/>
-                  </a:schemeClr>
-                </a:solidFill>
-                <a:latin typeface="Novecento sans wide Book" pitchFamily="50" charset="-94"/>
-                <a:cs typeface="Klavika" panose="020B0706030404030204" pitchFamily="34" charset="0"/>
-              </a:rPr>
-              <a:t>interactions.</a:t>
-            </a:r>
-            <a:endParaRPr lang="en-GB" dirty="0" smtClean="0">
-              <a:solidFill>
-                <a:schemeClr val="accent5">
-                  <a:lumMod val="75000"/>
-                </a:schemeClr>
-              </a:solidFill>
-              <a:latin typeface="Novecento sans wide Book" pitchFamily="50" charset="-94"/>
-              <a:cs typeface="Klavika" panose="020B0706030404030204" pitchFamily="34" charset="0"/>
-            </a:endParaRPr>
+              <a:t>Today, in the world of social networking and competitive gaming, many applications benefit from having direct contact with other clients. These applications have a much greater potential to become more popular with the end-users as they support social interactions.</a:t>
+            </a:r>
           </a:p>
           <a:p>
             <a:endParaRPr lang="en-GB" sz="3600" dirty="0">
@@ -17580,15 +17264,6 @@
               </a:rPr>
               <a:t>http://docs.yoyogames.com/source/dadiospice/002_reference/networking/index.html</a:t>
             </a:r>
-            <a:endParaRPr lang="en-GB" dirty="0">
-              <a:solidFill>
-                <a:schemeClr val="accent5">
-                  <a:lumMod val="75000"/>
-                </a:schemeClr>
-              </a:solidFill>
-              <a:latin typeface="Novecento sans wide Book" pitchFamily="50" charset="-94"/>
-              <a:cs typeface="Klavika" panose="020B0706030404030204" pitchFamily="34" charset="0"/>
-            </a:endParaRPr>
           </a:p>
         </p:txBody>
       </p:sp>
@@ -18517,31 +18192,7 @@
                 <a:latin typeface="Novecento sans wide Book" pitchFamily="50" charset="-94"/>
                 <a:cs typeface="Klavika" panose="020B0706030404030204" pitchFamily="34" charset="0"/>
               </a:rPr>
-              <a:t> is the first </a:t>
-            </a:r>
-            <a:r>
-              <a:rPr lang="en-GB" sz="3000" dirty="0">
-                <a:solidFill>
-                  <a:schemeClr val="accent5">
-                    <a:lumMod val="75000"/>
-                  </a:schemeClr>
-                </a:solidFill>
-                <a:latin typeface="Novecento sans wide Book" pitchFamily="50" charset="-94"/>
-                <a:cs typeface="Klavika" panose="020B0706030404030204" pitchFamily="34" charset="0"/>
-              </a:rPr>
-              <a:t>tool for working in the non-blocking, event-driven I/O paradigm</a:t>
-            </a:r>
-            <a:r>
-              <a:rPr lang="en-GB" sz="3000" dirty="0">
-                <a:solidFill>
-                  <a:schemeClr val="accent5">
-                    <a:lumMod val="75000"/>
-                  </a:schemeClr>
-                </a:solidFill>
-                <a:latin typeface="Novecento sans wide Book" pitchFamily="50" charset="-94"/>
-                <a:cs typeface="Klavika" panose="020B0706030404030204" pitchFamily="34" charset="0"/>
-              </a:rPr>
-              <a:t>. </a:t>
+              <a:t> is the first tool for working in the non-blocking, event-driven I/O paradigm. </a:t>
             </a:r>
             <a:endParaRPr lang="en-GB" sz="3000" dirty="0" smtClean="0">
               <a:solidFill>
@@ -18589,19 +18240,7 @@
                 <a:latin typeface="Novecento sans wide Book" pitchFamily="50" charset="-94"/>
                 <a:cs typeface="Klavika" panose="020B0706030404030204" pitchFamily="34" charset="0"/>
               </a:rPr>
-              <a:t>features had to be encapsulated </a:t>
-            </a:r>
-            <a:r>
-              <a:rPr lang="en-GB" sz="3000" dirty="0">
-                <a:solidFill>
-                  <a:schemeClr val="accent5">
-                    <a:lumMod val="75000"/>
-                  </a:schemeClr>
-                </a:solidFill>
-                <a:latin typeface="Novecento sans wide Book" pitchFamily="50" charset="-94"/>
-                <a:cs typeface="Klavika" panose="020B0706030404030204" pitchFamily="34" charset="0"/>
-              </a:rPr>
-              <a:t>within sandboxed environments like </a:t>
+              <a:t>features had to be encapsulated within sandboxed environments like </a:t>
             </a:r>
             <a:r>
               <a:rPr lang="en-GB" sz="3000" b="1" dirty="0">

</xml_diff>